<commit_message>
added retexs folder & update retex
</commit_message>
<xml_diff>
--- a/retex.pptx
+++ b/retex.pptx
@@ -211,7 +211,7 @@
           <a:p>
             <a:fld id="{3409E722-F049-4AAE-BBD3-8A696B6582F4}" type="datetimeFigureOut">
               <a:rPr lang="fr-FR" smtClean="0"/>
-              <a:t>21/03/2022</a:t>
+              <a:t>12/04/2022</a:t>
             </a:fld>
             <a:endParaRPr lang="fr-FR"/>
           </a:p>
@@ -431,7 +431,7 @@
           <a:p>
             <a:fld id="{0461DD1B-6DBD-4C67-82CA-2D2AD6682E71}" type="datetimeFigureOut">
               <a:rPr lang="fr-FR" smtClean="0"/>
-              <a:t>21/03/2022</a:t>
+              <a:t>12/04/2022</a:t>
             </a:fld>
             <a:endParaRPr lang="fr-FR"/>
           </a:p>
@@ -624,7 +624,7 @@
           <a:p>
             <a:fld id="{0461DD1B-6DBD-4C67-82CA-2D2AD6682E71}" type="datetimeFigureOut">
               <a:rPr lang="fr-FR" smtClean="0"/>
-              <a:t>21/03/2022</a:t>
+              <a:t>12/04/2022</a:t>
             </a:fld>
             <a:endParaRPr lang="fr-FR"/>
           </a:p>
@@ -810,7 +810,7 @@
           <a:p>
             <a:fld id="{0461DD1B-6DBD-4C67-82CA-2D2AD6682E71}" type="datetimeFigureOut">
               <a:rPr lang="fr-FR" smtClean="0"/>
-              <a:t>21/03/2022</a:t>
+              <a:t>12/04/2022</a:t>
             </a:fld>
             <a:endParaRPr lang="fr-FR"/>
           </a:p>
@@ -996,7 +996,7 @@
           <a:p>
             <a:fld id="{0461DD1B-6DBD-4C67-82CA-2D2AD6682E71}" type="datetimeFigureOut">
               <a:rPr lang="fr-FR" smtClean="0"/>
-              <a:t>21/03/2022</a:t>
+              <a:t>12/04/2022</a:t>
             </a:fld>
             <a:endParaRPr lang="fr-FR"/>
           </a:p>
@@ -1255,7 +1255,7 @@
           <a:p>
             <a:fld id="{0461DD1B-6DBD-4C67-82CA-2D2AD6682E71}" type="datetimeFigureOut">
               <a:rPr lang="fr-FR" smtClean="0"/>
-              <a:t>21/03/2022</a:t>
+              <a:t>12/04/2022</a:t>
             </a:fld>
             <a:endParaRPr lang="fr-FR"/>
           </a:p>
@@ -1501,7 +1501,7 @@
           <a:p>
             <a:fld id="{0461DD1B-6DBD-4C67-82CA-2D2AD6682E71}" type="datetimeFigureOut">
               <a:rPr lang="fr-FR" smtClean="0"/>
-              <a:t>21/03/2022</a:t>
+              <a:t>12/04/2022</a:t>
             </a:fld>
             <a:endParaRPr lang="fr-FR"/>
           </a:p>
@@ -1883,7 +1883,7 @@
           <a:p>
             <a:fld id="{0461DD1B-6DBD-4C67-82CA-2D2AD6682E71}" type="datetimeFigureOut">
               <a:rPr lang="fr-FR" smtClean="0"/>
-              <a:t>21/03/2022</a:t>
+              <a:t>12/04/2022</a:t>
             </a:fld>
             <a:endParaRPr lang="fr-FR"/>
           </a:p>
@@ -2009,7 +2009,7 @@
           <a:p>
             <a:fld id="{0461DD1B-6DBD-4C67-82CA-2D2AD6682E71}" type="datetimeFigureOut">
               <a:rPr lang="fr-FR" smtClean="0"/>
-              <a:t>21/03/2022</a:t>
+              <a:t>12/04/2022</a:t>
             </a:fld>
             <a:endParaRPr lang="fr-FR"/>
           </a:p>
@@ -2104,7 +2104,7 @@
           <a:p>
             <a:fld id="{0461DD1B-6DBD-4C67-82CA-2D2AD6682E71}" type="datetimeFigureOut">
               <a:rPr lang="fr-FR" smtClean="0"/>
-              <a:t>21/03/2022</a:t>
+              <a:t>12/04/2022</a:t>
             </a:fld>
             <a:endParaRPr lang="fr-FR"/>
           </a:p>
@@ -2390,7 +2390,7 @@
           <a:p>
             <a:fld id="{0461DD1B-6DBD-4C67-82CA-2D2AD6682E71}" type="datetimeFigureOut">
               <a:rPr lang="fr-FR" smtClean="0"/>
-              <a:t>21/03/2022</a:t>
+              <a:t>12/04/2022</a:t>
             </a:fld>
             <a:endParaRPr lang="fr-FR"/>
           </a:p>
@@ -2652,7 +2652,7 @@
           <a:p>
             <a:fld id="{0461DD1B-6DBD-4C67-82CA-2D2AD6682E71}" type="datetimeFigureOut">
               <a:rPr lang="fr-FR" smtClean="0"/>
-              <a:t>21/03/2022</a:t>
+              <a:t>12/04/2022</a:t>
             </a:fld>
             <a:endParaRPr lang="fr-FR"/>
           </a:p>
@@ -2746,12 +2746,17 @@
         </p:nvSpPr>
         <p:spPr>
           <a:xfrm>
-            <a:off x="191344" y="116632"/>
-            <a:ext cx="11809312" cy="6192688"/>
+            <a:off x="0" y="0"/>
+            <a:ext cx="12360696" cy="6858000"/>
           </a:xfrm>
           <a:prstGeom prst="rect">
             <a:avLst/>
           </a:prstGeom>
+          <a:ln>
+            <a:solidFill>
+              <a:schemeClr val="tx1"/>
+            </a:solidFill>
+          </a:ln>
         </p:spPr>
         <p:style>
           <a:lnRef idx="2">
@@ -2774,7 +2779,7 @@
           <a:lstStyle/>
           <a:p>
             <a:pPr algn="ctr"/>
-            <a:endParaRPr lang="fr-FR"/>
+            <a:endParaRPr lang="fr-FR" dirty="0"/>
           </a:p>
         </p:txBody>
       </p:sp>
@@ -2786,8 +2791,8 @@
         </p:nvSpPr>
         <p:spPr>
           <a:xfrm>
-            <a:off x="6672064" y="3573016"/>
-            <a:ext cx="5040560" cy="2592288"/>
+            <a:off x="6594648" y="3456384"/>
+            <a:ext cx="5406008" cy="2592288"/>
           </a:xfrm>
           <a:prstGeom prst="round2DiagRect">
             <a:avLst/>
@@ -2834,8 +2839,8 @@
         </p:nvSpPr>
         <p:spPr>
           <a:xfrm>
-            <a:off x="8040216" y="346954"/>
-            <a:ext cx="3528392" cy="3010038"/>
+            <a:off x="7896200" y="191047"/>
+            <a:ext cx="3897932" cy="3049313"/>
           </a:xfrm>
           <a:prstGeom prst="rect">
             <a:avLst/>
@@ -2889,12 +2894,18 @@
         </p:nvSpPr>
         <p:spPr>
           <a:xfrm>
-            <a:off x="1400432" y="6356350"/>
+            <a:off x="1209088" y="6239718"/>
             <a:ext cx="2180968" cy="365125"/>
           </a:xfrm>
           <a:prstGeom prst="rect">
             <a:avLst/>
           </a:prstGeom>
+          <a:ln cap="flat">
+            <a:solidFill>
+              <a:schemeClr val="tx1"/>
+            </a:solidFill>
+            <a:prstDash val="sysDash"/>
+          </a:ln>
         </p:spPr>
         <p:txBody>
           <a:bodyPr vert="horz" lIns="91440" tIns="45720" rIns="91440" bIns="45720" rtlCol="0" anchor="ctr"/>
@@ -2902,9 +2913,7 @@
             <a:lvl1pPr algn="l">
               <a:defRPr sz="1200">
                 <a:solidFill>
-                  <a:schemeClr val="tx1">
-                    <a:tint val="75000"/>
-                  </a:schemeClr>
+                  <a:schemeClr val="tx1"/>
                 </a:solidFill>
               </a:defRPr>
             </a:lvl1pPr>
@@ -2912,7 +2921,8 @@
           <a:p>
             <a:fld id="{0461DD1B-6DBD-4C67-82CA-2D2AD6682E71}" type="datetimeFigureOut">
               <a:rPr lang="fr-FR" smtClean="0"/>
-              <a:t>21/03/2022</a:t>
+              <a:pPr/>
+              <a:t>12/04/2022</a:t>
             </a:fld>
             <a:endParaRPr lang="fr-FR" dirty="0"/>
           </a:p>
@@ -2930,27 +2940,39 @@
         </p:nvSpPr>
         <p:spPr>
           <a:xfrm>
-            <a:off x="4038600" y="6356350"/>
+            <a:off x="4122948" y="6239718"/>
             <a:ext cx="4114800" cy="365125"/>
           </a:xfrm>
           <a:prstGeom prst="rect">
             <a:avLst/>
           </a:prstGeom>
+          <a:ln>
+            <a:solidFill>
+              <a:schemeClr val="tx1"/>
+            </a:solidFill>
+            <a:prstDash val="sysDash"/>
+          </a:ln>
         </p:spPr>
         <p:txBody>
           <a:bodyPr vert="horz" lIns="91440" tIns="45720" rIns="91440" bIns="45720" rtlCol="0" anchor="ctr"/>
           <a:lstStyle>
             <a:lvl1pPr algn="ctr">
-              <a:defRPr sz="1200">
+              <a:defRPr sz="1800">
                 <a:solidFill>
-                  <a:schemeClr val="tx1">
-                    <a:tint val="75000"/>
-                  </a:schemeClr>
+                  <a:schemeClr val="tx1"/>
                 </a:solidFill>
               </a:defRPr>
             </a:lvl1pPr>
           </a:lstStyle>
           <a:p>
+            <a:r>
+              <a:rPr lang="fr-FR" dirty="0" smtClean="0"/>
+              <a:t>MENIER Thomas </a:t>
+            </a:r>
+            <a:r>
+              <a:rPr lang="fr-FR" dirty="0" err="1" smtClean="0"/>
+              <a:t>Wanchaï</a:t>
+            </a:r>
             <a:endParaRPr lang="fr-FR" dirty="0"/>
           </a:p>
         </p:txBody>
@@ -2967,12 +2989,18 @@
         </p:nvSpPr>
         <p:spPr>
           <a:xfrm>
-            <a:off x="8610600" y="6356350"/>
+            <a:off x="8934636" y="6239717"/>
             <a:ext cx="2131541" cy="365125"/>
           </a:xfrm>
           <a:prstGeom prst="rect">
             <a:avLst/>
           </a:prstGeom>
+          <a:ln>
+            <a:solidFill>
+              <a:schemeClr val="tx1"/>
+            </a:solidFill>
+            <a:prstDash val="sysDash"/>
+          </a:ln>
         </p:spPr>
         <p:txBody>
           <a:bodyPr vert="horz" lIns="91440" tIns="45720" rIns="91440" bIns="45720" rtlCol="0" anchor="ctr"/>
@@ -2980,9 +3008,7 @@
             <a:lvl1pPr algn="r">
               <a:defRPr sz="1200">
                 <a:solidFill>
-                  <a:schemeClr val="tx1">
-                    <a:tint val="75000"/>
-                  </a:schemeClr>
+                  <a:schemeClr val="tx1"/>
                 </a:solidFill>
               </a:defRPr>
             </a:lvl1pPr>
@@ -2990,9 +3016,10 @@
           <a:p>
             <a:fld id="{D07C23C2-5C1D-40A9-AAAA-9D9D0FEFBBC0}" type="slidenum">
               <a:rPr lang="fr-FR" smtClean="0"/>
+              <a:pPr/>
               <a:t>‹N°›</a:t>
             </a:fld>
-            <a:endParaRPr lang="fr-FR"/>
+            <a:endParaRPr lang="fr-FR" dirty="0"/>
           </a:p>
         </p:txBody>
       </p:sp>
@@ -3004,8 +3031,8 @@
         </p:nvCxnSpPr>
         <p:spPr>
           <a:xfrm>
-            <a:off x="191344" y="116632"/>
-            <a:ext cx="11809312" cy="0"/>
+            <a:off x="0" y="0"/>
+            <a:ext cx="12360696" cy="0"/>
           </a:xfrm>
           <a:prstGeom prst="line">
             <a:avLst/>
@@ -3039,8 +3066,8 @@
         </p:nvCxnSpPr>
         <p:spPr>
           <a:xfrm>
-            <a:off x="191344" y="116632"/>
-            <a:ext cx="0" cy="6192688"/>
+            <a:off x="0" y="0"/>
+            <a:ext cx="0" cy="6858000"/>
           </a:xfrm>
           <a:prstGeom prst="line">
             <a:avLst/>
@@ -3074,8 +3101,8 @@
         </p:nvCxnSpPr>
         <p:spPr>
           <a:xfrm>
-            <a:off x="191344" y="6309320"/>
-            <a:ext cx="10729192" cy="0"/>
+            <a:off x="0" y="6858000"/>
+            <a:ext cx="12360696" cy="0"/>
           </a:xfrm>
           <a:prstGeom prst="line">
             <a:avLst/>
@@ -3109,7 +3136,7 @@
         </p:nvSpPr>
         <p:spPr>
           <a:xfrm rot="10800000">
-            <a:off x="10885611" y="5260950"/>
+            <a:off x="11246197" y="5811046"/>
             <a:ext cx="1114499" cy="1046954"/>
           </a:xfrm>
           <a:prstGeom prst="halfFrame">
@@ -3162,8 +3189,8 @@
         </p:nvCxnSpPr>
         <p:spPr>
           <a:xfrm>
-            <a:off x="12000656" y="116632"/>
-            <a:ext cx="0" cy="5145734"/>
+            <a:off x="12360696" y="0"/>
+            <a:ext cx="0" cy="6858000"/>
           </a:xfrm>
           <a:prstGeom prst="line">
             <a:avLst/>
@@ -3197,7 +3224,7 @@
         </p:nvSpPr>
         <p:spPr>
           <a:xfrm>
-            <a:off x="8328248" y="476672"/>
+            <a:off x="8379007" y="298171"/>
             <a:ext cx="2952328" cy="1204309"/>
           </a:xfrm>
           <a:prstGeom prst="roundRect">
@@ -3261,7 +3288,7 @@
         </p:nvSpPr>
         <p:spPr>
           <a:xfrm>
-            <a:off x="8400256" y="548680"/>
+            <a:off x="8451015" y="370179"/>
             <a:ext cx="906017" cy="338554"/>
           </a:xfrm>
           <a:prstGeom prst="rect">
@@ -3297,8 +3324,8 @@
         </p:nvSpPr>
         <p:spPr>
           <a:xfrm rot="5400000">
-            <a:off x="9703130" y="780055"/>
-            <a:ext cx="208243" cy="2525960"/>
+            <a:off x="9702182" y="518708"/>
+            <a:ext cx="305977" cy="2559632"/>
           </a:xfrm>
           <a:prstGeom prst="leftBrace">
             <a:avLst>
@@ -3343,8 +3370,8 @@
         </p:nvSpPr>
         <p:spPr>
           <a:xfrm rot="5400000">
-            <a:off x="9753704" y="1556386"/>
-            <a:ext cx="101416" cy="1080120"/>
+            <a:off x="9769903" y="1335744"/>
+            <a:ext cx="185698" cy="1080120"/>
           </a:xfrm>
           <a:prstGeom prst="leftBrace">
             <a:avLst>
@@ -3389,7 +3416,7 @@
         </p:nvSpPr>
         <p:spPr>
           <a:xfrm>
-            <a:off x="8112224" y="2147155"/>
+            <a:off x="8162983" y="1968654"/>
             <a:ext cx="3384376" cy="1100310"/>
           </a:xfrm>
           <a:prstGeom prst="snip2SameRect">
@@ -3439,7 +3466,7 @@
         </p:nvSpPr>
         <p:spPr>
           <a:xfrm>
-            <a:off x="8569425" y="2202606"/>
+            <a:off x="8620184" y="2024105"/>
             <a:ext cx="2531639" cy="338554"/>
           </a:xfrm>
           <a:prstGeom prst="rect">
@@ -3474,7 +3501,7 @@
         </p:nvSpPr>
         <p:spPr>
           <a:xfrm>
-            <a:off x="551384" y="1196752"/>
+            <a:off x="360040" y="1080120"/>
             <a:ext cx="6984776" cy="2088232"/>
           </a:xfrm>
           <a:prstGeom prst="round2DiagRect">
@@ -3530,7 +3557,7 @@
         </p:nvSpPr>
         <p:spPr>
           <a:xfrm>
-            <a:off x="767408" y="1340768"/>
+            <a:off x="576064" y="1224136"/>
             <a:ext cx="2557110" cy="461665"/>
           </a:xfrm>
           <a:prstGeom prst="rect">
@@ -3564,7 +3591,7 @@
         </p:nvSpPr>
         <p:spPr>
           <a:xfrm>
-            <a:off x="551384" y="3573016"/>
+            <a:off x="360040" y="3456384"/>
             <a:ext cx="5688632" cy="2592288"/>
           </a:xfrm>
           <a:prstGeom prst="rect">
@@ -3621,7 +3648,7 @@
         </p:nvSpPr>
         <p:spPr>
           <a:xfrm>
-            <a:off x="623392" y="3645023"/>
+            <a:off x="432048" y="3528391"/>
             <a:ext cx="2175526" cy="461665"/>
           </a:xfrm>
           <a:prstGeom prst="rect">
@@ -3655,7 +3682,7 @@
         </p:nvSpPr>
         <p:spPr>
           <a:xfrm>
-            <a:off x="6672064" y="3573016"/>
+            <a:off x="6594649" y="3456384"/>
             <a:ext cx="1400883" cy="1296144"/>
           </a:xfrm>
           <a:prstGeom prst="diagStripe">
@@ -3707,7 +3734,7 @@
         </p:nvSpPr>
         <p:spPr>
           <a:xfrm>
-            <a:off x="8472264" y="3645024"/>
+            <a:off x="8769797" y="3528391"/>
             <a:ext cx="3024336" cy="461665"/>
           </a:xfrm>
           <a:prstGeom prst="rect">
@@ -3748,7 +3775,7 @@
         </p:nvSpPr>
         <p:spPr>
           <a:xfrm>
-            <a:off x="2211459" y="116632"/>
+            <a:off x="1998236" y="84782"/>
             <a:ext cx="4116448" cy="923330"/>
           </a:xfrm>
           <a:prstGeom prst="rect">
@@ -3817,6 +3844,118 @@
                 </a:outerShdw>
               </a:effectLst>
               <a:latin typeface="Gill Sans MT" panose="020B0502020104020203" pitchFamily="34" charset="0"/>
+            </a:endParaRPr>
+          </a:p>
+        </p:txBody>
+      </p:sp>
+      <p:sp>
+        <p:nvSpPr>
+          <p:cNvPr id="19" name="ZoneTexte 18"/>
+          <p:cNvSpPr txBox="1"/>
+          <p:nvPr userDrawn="1"/>
+        </p:nvSpPr>
+        <p:spPr>
+          <a:xfrm>
+            <a:off x="902581" y="1645535"/>
+            <a:ext cx="6120680" cy="1295868"/>
+          </a:xfrm>
+          <a:prstGeom prst="rect">
+            <a:avLst/>
+          </a:prstGeom>
+          <a:noFill/>
+        </p:spPr>
+        <p:txBody>
+          <a:bodyPr wrap="square" rtlCol="0">
+            <a:spAutoFit/>
+          </a:bodyPr>
+          <a:lstStyle/>
+          <a:p>
+            <a:pPr>
+              <a:lnSpc>
+                <a:spcPct val="150000"/>
+              </a:lnSpc>
+            </a:pPr>
+            <a:r>
+              <a:rPr lang="fr-FR" b="1" dirty="0" smtClean="0"/>
+              <a:t>&gt;</a:t>
+            </a:r>
+          </a:p>
+          <a:p>
+            <a:pPr>
+              <a:lnSpc>
+                <a:spcPct val="150000"/>
+              </a:lnSpc>
+            </a:pPr>
+            <a:r>
+              <a:rPr lang="fr-FR" b="1" dirty="0" smtClean="0"/>
+              <a:t>&gt;</a:t>
+            </a:r>
+          </a:p>
+          <a:p>
+            <a:pPr>
+              <a:lnSpc>
+                <a:spcPct val="150000"/>
+              </a:lnSpc>
+            </a:pPr>
+            <a:r>
+              <a:rPr lang="fr-FR" b="1" dirty="0" smtClean="0"/>
+              <a:t>&gt;</a:t>
+            </a:r>
+            <a:endParaRPr lang="fr-FR" b="1" dirty="0"/>
+          </a:p>
+        </p:txBody>
+      </p:sp>
+      <p:sp>
+        <p:nvSpPr>
+          <p:cNvPr id="20" name="ZoneTexte 19"/>
+          <p:cNvSpPr txBox="1"/>
+          <p:nvPr userDrawn="1"/>
+        </p:nvSpPr>
+        <p:spPr>
+          <a:xfrm>
+            <a:off x="8379007" y="2334489"/>
+            <a:ext cx="2952328" cy="646331"/>
+          </a:xfrm>
+          <a:prstGeom prst="rect">
+            <a:avLst/>
+          </a:prstGeom>
+          <a:noFill/>
+        </p:spPr>
+        <p:txBody>
+          <a:bodyPr wrap="square" rtlCol="0">
+            <a:spAutoFit/>
+          </a:bodyPr>
+          <a:lstStyle/>
+          <a:p>
+            <a:pPr algn="ctr"/>
+            <a:r>
+              <a:rPr lang="fr-FR" dirty="0" err="1" smtClean="0">
+                <a:latin typeface="Noto Mono" panose="020B0609030804020204" pitchFamily="49" charset="0"/>
+                <a:ea typeface="Noto Mono" panose="020B0609030804020204" pitchFamily="49" charset="0"/>
+                <a:cs typeface="Noto Mono" panose="020B0609030804020204" pitchFamily="49" charset="0"/>
+              </a:rPr>
+              <a:t>Stuff</a:t>
+            </a:r>
+            <a:endParaRPr lang="fr-FR" dirty="0" smtClean="0">
+              <a:latin typeface="Noto Mono" panose="020B0609030804020204" pitchFamily="49" charset="0"/>
+              <a:ea typeface="Noto Mono" panose="020B0609030804020204" pitchFamily="49" charset="0"/>
+              <a:cs typeface="Noto Mono" panose="020B0609030804020204" pitchFamily="49" charset="0"/>
+            </a:endParaRPr>
+          </a:p>
+          <a:p>
+            <a:pPr algn="ctr"/>
+            <a:r>
+              <a:rPr lang="fr-FR" dirty="0" err="1" smtClean="0">
+                <a:latin typeface="Noto Mono" panose="020B0609030804020204" pitchFamily="49" charset="0"/>
+                <a:ea typeface="Noto Mono" panose="020B0609030804020204" pitchFamily="49" charset="0"/>
+                <a:cs typeface="Noto Mono" panose="020B0609030804020204" pitchFamily="49" charset="0"/>
+              </a:rPr>
+              <a:t>Stuff</a:t>
+            </a:r>
+            <a:endParaRPr lang="fr-FR" dirty="0">
+              <a:latin typeface="Noto Mono" panose="020B0609030804020204" pitchFamily="49" charset="0"/>
+              <a:ea typeface="Noto Mono" panose="020B0609030804020204" pitchFamily="49" charset="0"/>
+              <a:cs typeface="Noto Mono" panose="020B0609030804020204" pitchFamily="49" charset="0"/>
             </a:endParaRPr>
           </a:p>
         </p:txBody>

</xml_diff>